<commit_message>
pre final version 2
</commit_message>
<xml_diff>
--- a/Презентація Ксендзук.pptx
+++ b/Презентація Ксендзук.pptx
@@ -287,7 +287,7 @@
       </p15:sldGuideLst>
     </p:ext>
     <p:ext uri="GoogleSlidesCustomDataVersion2">
-      <go:slidesCustomData xmlns:go="http://customooxmlschemas.google.com/" xmlns:ahyp="http://schemas.microsoft.com/office/drawing/2018/hyperlinkcolor" xmlns:p15="http://schemas.microsoft.com/office/powerpoint/2012/main" xmlns:p14="http://schemas.microsoft.com/office/powerpoint/2010/main" xmlns:com="http://schemas.openxmlformats.org/drawingml/2006/compatibility" xmlns:pvml="urn:schemas-microsoft-com:office:powerpoint" xmlns:v="urn:schemas-microsoft-com:vml" xmlns:o="urn:schemas-microsoft-com:office:office" xmlns:dgm="http://schemas.openxmlformats.org/drawingml/2006/diagram" xmlns:c="http://schemas.openxmlformats.org/drawingml/2006/chart" xmlns:mv="urn:schemas-microsoft-com:mac:vml" xmlns:mc="http://schemas.openxmlformats.org/markup-compatibility/2006" xmlns="" r:id="rId23" roundtripDataSignature="AMtx7mhfiMQb8F8Cm93H5k/Rj9aXHGu3dw=="/>
+      <go:slidesCustomData xmlns="" xmlns:mc="http://schemas.openxmlformats.org/markup-compatibility/2006" xmlns:mv="urn:schemas-microsoft-com:mac:vml" xmlns:c="http://schemas.openxmlformats.org/drawingml/2006/chart" xmlns:dgm="http://schemas.openxmlformats.org/drawingml/2006/diagram" xmlns:o="urn:schemas-microsoft-com:office:office" xmlns:v="urn:schemas-microsoft-com:vml" xmlns:pvml="urn:schemas-microsoft-com:office:powerpoint" xmlns:com="http://schemas.openxmlformats.org/drawingml/2006/compatibility" xmlns:p14="http://schemas.microsoft.com/office/powerpoint/2010/main" xmlns:p15="http://schemas.microsoft.com/office/powerpoint/2012/main" xmlns:ahyp="http://schemas.microsoft.com/office/drawing/2018/hyperlinkcolor" xmlns:go="http://customooxmlschemas.google.com/" r:id="rId23" roundtripDataSignature="AMtx7mhfiMQb8F8Cm93H5k/Rj9aXHGu3dw=="/>
     </p:ext>
   </p:extLst>
 </p:presentation>
@@ -23012,8 +23012,8 @@
         </p:nvSpPr>
         <p:spPr>
           <a:xfrm>
-            <a:off x="2980823" y="1243173"/>
-            <a:ext cx="8832836" cy="1457140"/>
+            <a:off x="2980823" y="1540400"/>
+            <a:ext cx="8832836" cy="1228971"/>
           </a:xfrm>
           <a:prstGeom prst="rect">
             <a:avLst/>
@@ -23049,7 +23049,7 @@
                 <a:ea typeface="Calibri" panose="020F0502020204030204" pitchFamily="34" charset="0"/>
                 <a:cs typeface="Times New Roman" panose="02020603050405020304" pitchFamily="18" charset="0"/>
               </a:rPr>
-              <a:t>оптимальної моделі використання процесів </a:t>
+              <a:t>моделі використання процесів </a:t>
             </a:r>
             <a:r>
               <a:rPr lang="en-US" sz="1800" dirty="0">
@@ -23142,8 +23142,8 @@
         </p:nvSpPr>
         <p:spPr>
           <a:xfrm>
-            <a:off x="573209" y="1243173"/>
-            <a:ext cx="2407614" cy="1457140"/>
+            <a:off x="573209" y="1534034"/>
+            <a:ext cx="2407614" cy="1228971"/>
           </a:xfrm>
           <a:prstGeom prst="rect">
             <a:avLst/>
@@ -23192,7 +23192,7 @@
         </p:nvSpPr>
         <p:spPr>
           <a:xfrm>
-            <a:off x="2980823" y="4459395"/>
+            <a:off x="2980823" y="4462578"/>
             <a:ext cx="8832836" cy="1012505"/>
           </a:xfrm>
           <a:prstGeom prst="rect">
@@ -23304,7 +23304,7 @@
         </p:nvSpPr>
         <p:spPr>
           <a:xfrm>
-            <a:off x="573209" y="4459395"/>
+            <a:off x="573209" y="4462578"/>
             <a:ext cx="2407614" cy="1012505"/>
           </a:xfrm>
           <a:prstGeom prst="rect">
@@ -23360,7 +23360,7 @@
         </p:nvSpPr>
         <p:spPr>
           <a:xfrm>
-            <a:off x="2980823" y="3103356"/>
+            <a:off x="2980823" y="3106539"/>
             <a:ext cx="8832836" cy="1012505"/>
           </a:xfrm>
           <a:prstGeom prst="rect">
@@ -23433,7 +23433,7 @@
         </p:nvSpPr>
         <p:spPr>
           <a:xfrm>
-            <a:off x="573209" y="3103357"/>
+            <a:off x="573209" y="3106540"/>
             <a:ext cx="2407614" cy="1012505"/>
           </a:xfrm>
           <a:prstGeom prst="rect">
@@ -23758,8 +23758,8 @@
         </p:nvSpPr>
         <p:spPr>
           <a:xfrm>
-            <a:off x="2980823" y="1243173"/>
-            <a:ext cx="8832836" cy="1457140"/>
+            <a:off x="2980823" y="1530851"/>
+            <a:ext cx="8832836" cy="1228971"/>
           </a:xfrm>
           <a:prstGeom prst="rect">
             <a:avLst/>
@@ -23811,56 +23811,6 @@
               <a:latin typeface="+mj-lt"/>
               <a:ea typeface="UAF Sans" pitchFamily="2" charset="-52"/>
               <a:cs typeface="Arial" panose="020B0604020202020204" pitchFamily="34" charset="0"/>
-            </a:endParaRPr>
-          </a:p>
-        </p:txBody>
-      </p:sp>
-      <p:sp>
-        <p:nvSpPr>
-          <p:cNvPr id="10" name="Google Shape;108;p8"/>
-          <p:cNvSpPr/>
-          <p:nvPr/>
-        </p:nvSpPr>
-        <p:spPr>
-          <a:xfrm>
-            <a:off x="573209" y="1243173"/>
-            <a:ext cx="2407614" cy="1457140"/>
-          </a:xfrm>
-          <a:prstGeom prst="rect">
-            <a:avLst/>
-          </a:prstGeom>
-          <a:solidFill>
-            <a:srgbClr val="4E4634"/>
-          </a:solidFill>
-          <a:ln>
-            <a:noFill/>
-          </a:ln>
-        </p:spPr>
-        <p:txBody>
-          <a:bodyPr spcFirstLastPara="1" wrap="square" lIns="91425" tIns="91425" rIns="91425" bIns="91425" anchor="ctr" anchorCtr="0">
-            <a:noAutofit/>
-          </a:bodyPr>
-          <a:lstStyle/>
-          <a:p>
-            <a:pPr lvl="0" algn="ctr">
-              <a:buSzPts val="1400"/>
-            </a:pPr>
-            <a:r>
-              <a:rPr lang="en-US" sz="3200" b="1" dirty="0">
-                <a:solidFill>
-                  <a:schemeClr val="bg1"/>
-                </a:solidFill>
-                <a:latin typeface="UAF Sans" pitchFamily="2" charset="-52"/>
-                <a:ea typeface="UAF Sans" pitchFamily="2" charset="-52"/>
-              </a:rPr>
-              <a:t>1</a:t>
-            </a:r>
-            <a:endParaRPr lang="uk-UA" sz="3200" dirty="0">
-              <a:solidFill>
-                <a:schemeClr val="bg1"/>
-              </a:solidFill>
-              <a:latin typeface="UAF Sans" pitchFamily="2" charset="-52"/>
-              <a:ea typeface="UAF Sans" pitchFamily="2" charset="-52"/>
             </a:endParaRPr>
           </a:p>
         </p:txBody>
@@ -24123,6 +24073,62 @@
             <a:endParaRPr lang="uk-UA" b="1" dirty="0">
               <a:solidFill>
                 <a:schemeClr val="tx1"/>
+              </a:solidFill>
+              <a:latin typeface="UAF Sans" pitchFamily="2" charset="-52"/>
+              <a:ea typeface="UAF Sans" pitchFamily="2" charset="-52"/>
+            </a:endParaRPr>
+          </a:p>
+        </p:txBody>
+      </p:sp>
+      <p:sp>
+        <p:nvSpPr>
+          <p:cNvPr id="14" name="Google Shape;108;p8">
+            <a:extLst>
+              <a:ext uri="{FF2B5EF4-FFF2-40B4-BE49-F238E27FC236}">
+                <a16:creationId xmlns:a16="http://schemas.microsoft.com/office/drawing/2014/main" id="{C6B7F49E-DAE7-4B9E-9D4B-03240597CF44}"/>
+              </a:ext>
+            </a:extLst>
+          </p:cNvPr>
+          <p:cNvSpPr/>
+          <p:nvPr/>
+        </p:nvSpPr>
+        <p:spPr>
+          <a:xfrm>
+            <a:off x="573209" y="1534034"/>
+            <a:ext cx="2407614" cy="1228971"/>
+          </a:xfrm>
+          <a:prstGeom prst="rect">
+            <a:avLst/>
+          </a:prstGeom>
+          <a:solidFill>
+            <a:srgbClr val="4E4634"/>
+          </a:solidFill>
+          <a:ln>
+            <a:noFill/>
+          </a:ln>
+        </p:spPr>
+        <p:txBody>
+          <a:bodyPr spcFirstLastPara="1" wrap="square" lIns="91425" tIns="91425" rIns="91425" bIns="91425" anchor="ctr" anchorCtr="0">
+            <a:noAutofit/>
+          </a:bodyPr>
+          <a:lstStyle/>
+          <a:p>
+            <a:pPr lvl="0" algn="ctr">
+              <a:buSzPts val="1400"/>
+            </a:pPr>
+            <a:r>
+              <a:rPr lang="uk-UA" sz="3200" b="1" dirty="0">
+                <a:solidFill>
+                  <a:schemeClr val="bg1"/>
+                </a:solidFill>
+                <a:latin typeface="UAF Sans" pitchFamily="2" charset="-52"/>
+                <a:ea typeface="UAF Sans" pitchFamily="2" charset="-52"/>
+              </a:rPr>
+              <a:t>1</a:t>
+            </a:r>
+            <a:endParaRPr lang="uk-UA" sz="3200" dirty="0">
+              <a:solidFill>
+                <a:schemeClr val="bg1"/>
               </a:solidFill>
               <a:latin typeface="UAF Sans" pitchFamily="2" charset="-52"/>
               <a:ea typeface="UAF Sans" pitchFamily="2" charset="-52"/>

</xml_diff>